<commit_message>
arrow image successfully outputed
debagged the code to output arrow image. I need to change the CFR in the arrow image
</commit_message>
<xml_diff>
--- a/Resources/arrow_image.pptx
+++ b/Resources/arrow_image.pptx
@@ -154,10 +154,9 @@
           </a:lstStyle>
           <a:p>
             <a:r>
-              <a:rPr lang="en-US" smtClean="0"/>
+              <a:rPr lang="en-US"/>
               <a:t>Click to edit Master title style</a:t>
             </a:r>
-            <a:endParaRPr lang="en-US"/>
           </a:p>
         </p:txBody>
       </p:sp>
@@ -219,10 +218,9 @@
           </a:lstStyle>
           <a:p>
             <a:r>
-              <a:rPr lang="en-US" smtClean="0"/>
+              <a:rPr lang="en-US"/>
               <a:t>Click to edit Master subtitle style</a:t>
             </a:r>
-            <a:endParaRPr lang="en-US"/>
           </a:p>
         </p:txBody>
       </p:sp>
@@ -243,7 +241,7 @@
           <a:p>
             <a:fld id="{FC655257-E31F-4E38-8042-08625497D8D8}" type="datetimeFigureOut">
               <a:rPr lang="en-US" smtClean="0"/>
-              <a:t>08-Feb-20</a:t>
+              <a:t>2/10/2020</a:t>
             </a:fld>
             <a:endParaRPr lang="en-US"/>
           </a:p>
@@ -337,10 +335,9 @@
           <a:lstStyle/>
           <a:p>
             <a:r>
-              <a:rPr lang="en-US" smtClean="0"/>
+              <a:rPr lang="en-US"/>
               <a:t>Click to edit Master title style</a:t>
             </a:r>
-            <a:endParaRPr lang="en-US"/>
           </a:p>
         </p:txBody>
       </p:sp>
@@ -361,38 +358,37 @@
           <a:p>
             <a:pPr lvl="0"/>
             <a:r>
-              <a:rPr lang="en-US" smtClean="0"/>
+              <a:rPr lang="en-US"/>
               <a:t>Click to edit Master text styles</a:t>
             </a:r>
           </a:p>
           <a:p>
             <a:pPr lvl="1"/>
             <a:r>
-              <a:rPr lang="en-US" smtClean="0"/>
+              <a:rPr lang="en-US"/>
               <a:t>Second level</a:t>
             </a:r>
           </a:p>
           <a:p>
             <a:pPr lvl="2"/>
             <a:r>
-              <a:rPr lang="en-US" smtClean="0"/>
+              <a:rPr lang="en-US"/>
               <a:t>Third level</a:t>
             </a:r>
           </a:p>
           <a:p>
             <a:pPr lvl="3"/>
             <a:r>
-              <a:rPr lang="en-US" smtClean="0"/>
+              <a:rPr lang="en-US"/>
               <a:t>Fourth level</a:t>
             </a:r>
           </a:p>
           <a:p>
             <a:pPr lvl="4"/>
             <a:r>
-              <a:rPr lang="en-US" smtClean="0"/>
+              <a:rPr lang="en-US"/>
               <a:t>Fifth level</a:t>
             </a:r>
-            <a:endParaRPr lang="en-US"/>
           </a:p>
         </p:txBody>
       </p:sp>
@@ -413,7 +409,7 @@
           <a:p>
             <a:fld id="{FC655257-E31F-4E38-8042-08625497D8D8}" type="datetimeFigureOut">
               <a:rPr lang="en-US" smtClean="0"/>
-              <a:t>08-Feb-20</a:t>
+              <a:t>2/10/2020</a:t>
             </a:fld>
             <a:endParaRPr lang="en-US"/>
           </a:p>
@@ -512,10 +508,9 @@
           <a:lstStyle/>
           <a:p>
             <a:r>
-              <a:rPr lang="en-US" smtClean="0"/>
+              <a:rPr lang="en-US"/>
               <a:t>Click to edit Master title style</a:t>
             </a:r>
-            <a:endParaRPr lang="en-US"/>
           </a:p>
         </p:txBody>
       </p:sp>
@@ -541,38 +536,37 @@
           <a:p>
             <a:pPr lvl="0"/>
             <a:r>
-              <a:rPr lang="en-US" smtClean="0"/>
+              <a:rPr lang="en-US"/>
               <a:t>Click to edit Master text styles</a:t>
             </a:r>
           </a:p>
           <a:p>
             <a:pPr lvl="1"/>
             <a:r>
-              <a:rPr lang="en-US" smtClean="0"/>
+              <a:rPr lang="en-US"/>
               <a:t>Second level</a:t>
             </a:r>
           </a:p>
           <a:p>
             <a:pPr lvl="2"/>
             <a:r>
-              <a:rPr lang="en-US" smtClean="0"/>
+              <a:rPr lang="en-US"/>
               <a:t>Third level</a:t>
             </a:r>
           </a:p>
           <a:p>
             <a:pPr lvl="3"/>
             <a:r>
-              <a:rPr lang="en-US" smtClean="0"/>
+              <a:rPr lang="en-US"/>
               <a:t>Fourth level</a:t>
             </a:r>
           </a:p>
           <a:p>
             <a:pPr lvl="4"/>
             <a:r>
-              <a:rPr lang="en-US" smtClean="0"/>
+              <a:rPr lang="en-US"/>
               <a:t>Fifth level</a:t>
             </a:r>
-            <a:endParaRPr lang="en-US"/>
           </a:p>
         </p:txBody>
       </p:sp>
@@ -593,7 +587,7 @@
           <a:p>
             <a:fld id="{FC655257-E31F-4E38-8042-08625497D8D8}" type="datetimeFigureOut">
               <a:rPr lang="en-US" smtClean="0"/>
-              <a:t>08-Feb-20</a:t>
+              <a:t>2/10/2020</a:t>
             </a:fld>
             <a:endParaRPr lang="en-US"/>
           </a:p>
@@ -687,10 +681,9 @@
           <a:lstStyle/>
           <a:p>
             <a:r>
-              <a:rPr lang="en-US" smtClean="0"/>
+              <a:rPr lang="en-US"/>
               <a:t>Click to edit Master title style</a:t>
             </a:r>
-            <a:endParaRPr lang="en-US"/>
           </a:p>
         </p:txBody>
       </p:sp>
@@ -711,38 +704,37 @@
           <a:p>
             <a:pPr lvl="0"/>
             <a:r>
-              <a:rPr lang="en-US" smtClean="0"/>
+              <a:rPr lang="en-US"/>
               <a:t>Click to edit Master text styles</a:t>
             </a:r>
           </a:p>
           <a:p>
             <a:pPr lvl="1"/>
             <a:r>
-              <a:rPr lang="en-US" smtClean="0"/>
+              <a:rPr lang="en-US"/>
               <a:t>Second level</a:t>
             </a:r>
           </a:p>
           <a:p>
             <a:pPr lvl="2"/>
             <a:r>
-              <a:rPr lang="en-US" smtClean="0"/>
+              <a:rPr lang="en-US"/>
               <a:t>Third level</a:t>
             </a:r>
           </a:p>
           <a:p>
             <a:pPr lvl="3"/>
             <a:r>
-              <a:rPr lang="en-US" smtClean="0"/>
+              <a:rPr lang="en-US"/>
               <a:t>Fourth level</a:t>
             </a:r>
           </a:p>
           <a:p>
             <a:pPr lvl="4"/>
             <a:r>
-              <a:rPr lang="en-US" smtClean="0"/>
+              <a:rPr lang="en-US"/>
               <a:t>Fifth level</a:t>
             </a:r>
-            <a:endParaRPr lang="en-US"/>
           </a:p>
         </p:txBody>
       </p:sp>
@@ -763,7 +755,7 @@
           <a:p>
             <a:fld id="{FC655257-E31F-4E38-8042-08625497D8D8}" type="datetimeFigureOut">
               <a:rPr lang="en-US" smtClean="0"/>
-              <a:t>08-Feb-20</a:t>
+              <a:t>2/10/2020</a:t>
             </a:fld>
             <a:endParaRPr lang="en-US"/>
           </a:p>
@@ -866,10 +858,9 @@
           </a:lstStyle>
           <a:p>
             <a:r>
-              <a:rPr lang="en-US" smtClean="0"/>
+              <a:rPr lang="en-US"/>
               <a:t>Click to edit Master title style</a:t>
             </a:r>
-            <a:endParaRPr lang="en-US"/>
           </a:p>
         </p:txBody>
       </p:sp>
@@ -986,7 +977,7 @@
           <a:p>
             <a:pPr lvl="0"/>
             <a:r>
-              <a:rPr lang="en-US" smtClean="0"/>
+              <a:rPr lang="en-US"/>
               <a:t>Click to edit Master text styles</a:t>
             </a:r>
           </a:p>
@@ -1009,7 +1000,7 @@
           <a:p>
             <a:fld id="{FC655257-E31F-4E38-8042-08625497D8D8}" type="datetimeFigureOut">
               <a:rPr lang="en-US" smtClean="0"/>
-              <a:t>08-Feb-20</a:t>
+              <a:t>2/10/2020</a:t>
             </a:fld>
             <a:endParaRPr lang="en-US"/>
           </a:p>
@@ -1103,10 +1094,9 @@
           <a:lstStyle/>
           <a:p>
             <a:r>
-              <a:rPr lang="en-US" smtClean="0"/>
+              <a:rPr lang="en-US"/>
               <a:t>Click to edit Master title style</a:t>
             </a:r>
-            <a:endParaRPr lang="en-US"/>
           </a:p>
         </p:txBody>
       </p:sp>
@@ -1132,38 +1122,37 @@
           <a:p>
             <a:pPr lvl="0"/>
             <a:r>
-              <a:rPr lang="en-US" smtClean="0"/>
+              <a:rPr lang="en-US"/>
               <a:t>Click to edit Master text styles</a:t>
             </a:r>
           </a:p>
           <a:p>
             <a:pPr lvl="1"/>
             <a:r>
-              <a:rPr lang="en-US" smtClean="0"/>
+              <a:rPr lang="en-US"/>
               <a:t>Second level</a:t>
             </a:r>
           </a:p>
           <a:p>
             <a:pPr lvl="2"/>
             <a:r>
-              <a:rPr lang="en-US" smtClean="0"/>
+              <a:rPr lang="en-US"/>
               <a:t>Third level</a:t>
             </a:r>
           </a:p>
           <a:p>
             <a:pPr lvl="3"/>
             <a:r>
-              <a:rPr lang="en-US" smtClean="0"/>
+              <a:rPr lang="en-US"/>
               <a:t>Fourth level</a:t>
             </a:r>
           </a:p>
           <a:p>
             <a:pPr lvl="4"/>
             <a:r>
-              <a:rPr lang="en-US" smtClean="0"/>
+              <a:rPr lang="en-US"/>
               <a:t>Fifth level</a:t>
             </a:r>
-            <a:endParaRPr lang="en-US"/>
           </a:p>
         </p:txBody>
       </p:sp>
@@ -1189,38 +1178,37 @@
           <a:p>
             <a:pPr lvl="0"/>
             <a:r>
-              <a:rPr lang="en-US" smtClean="0"/>
+              <a:rPr lang="en-US"/>
               <a:t>Click to edit Master text styles</a:t>
             </a:r>
           </a:p>
           <a:p>
             <a:pPr lvl="1"/>
             <a:r>
-              <a:rPr lang="en-US" smtClean="0"/>
+              <a:rPr lang="en-US"/>
               <a:t>Second level</a:t>
             </a:r>
           </a:p>
           <a:p>
             <a:pPr lvl="2"/>
             <a:r>
-              <a:rPr lang="en-US" smtClean="0"/>
+              <a:rPr lang="en-US"/>
               <a:t>Third level</a:t>
             </a:r>
           </a:p>
           <a:p>
             <a:pPr lvl="3"/>
             <a:r>
-              <a:rPr lang="en-US" smtClean="0"/>
+              <a:rPr lang="en-US"/>
               <a:t>Fourth level</a:t>
             </a:r>
           </a:p>
           <a:p>
             <a:pPr lvl="4"/>
             <a:r>
-              <a:rPr lang="en-US" smtClean="0"/>
+              <a:rPr lang="en-US"/>
               <a:t>Fifth level</a:t>
             </a:r>
-            <a:endParaRPr lang="en-US"/>
           </a:p>
         </p:txBody>
       </p:sp>
@@ -1241,7 +1229,7 @@
           <a:p>
             <a:fld id="{FC655257-E31F-4E38-8042-08625497D8D8}" type="datetimeFigureOut">
               <a:rPr lang="en-US" smtClean="0"/>
-              <a:t>08-Feb-20</a:t>
+              <a:t>2/10/2020</a:t>
             </a:fld>
             <a:endParaRPr lang="en-US"/>
           </a:p>
@@ -1340,10 +1328,9 @@
           <a:lstStyle/>
           <a:p>
             <a:r>
-              <a:rPr lang="en-US" smtClean="0"/>
+              <a:rPr lang="en-US"/>
               <a:t>Click to edit Master title style</a:t>
             </a:r>
-            <a:endParaRPr lang="en-US"/>
           </a:p>
         </p:txBody>
       </p:sp>
@@ -1406,7 +1393,7 @@
           <a:p>
             <a:pPr lvl="0"/>
             <a:r>
-              <a:rPr lang="en-US" smtClean="0"/>
+              <a:rPr lang="en-US"/>
               <a:t>Click to edit Master text styles</a:t>
             </a:r>
           </a:p>
@@ -1434,38 +1421,37 @@
           <a:p>
             <a:pPr lvl="0"/>
             <a:r>
-              <a:rPr lang="en-US" smtClean="0"/>
+              <a:rPr lang="en-US"/>
               <a:t>Click to edit Master text styles</a:t>
             </a:r>
           </a:p>
           <a:p>
             <a:pPr lvl="1"/>
             <a:r>
-              <a:rPr lang="en-US" smtClean="0"/>
+              <a:rPr lang="en-US"/>
               <a:t>Second level</a:t>
             </a:r>
           </a:p>
           <a:p>
             <a:pPr lvl="2"/>
             <a:r>
-              <a:rPr lang="en-US" smtClean="0"/>
+              <a:rPr lang="en-US"/>
               <a:t>Third level</a:t>
             </a:r>
           </a:p>
           <a:p>
             <a:pPr lvl="3"/>
             <a:r>
-              <a:rPr lang="en-US" smtClean="0"/>
+              <a:rPr lang="en-US"/>
               <a:t>Fourth level</a:t>
             </a:r>
           </a:p>
           <a:p>
             <a:pPr lvl="4"/>
             <a:r>
-              <a:rPr lang="en-US" smtClean="0"/>
+              <a:rPr lang="en-US"/>
               <a:t>Fifth level</a:t>
             </a:r>
-            <a:endParaRPr lang="en-US"/>
           </a:p>
         </p:txBody>
       </p:sp>
@@ -1528,7 +1514,7 @@
           <a:p>
             <a:pPr lvl="0"/>
             <a:r>
-              <a:rPr lang="en-US" smtClean="0"/>
+              <a:rPr lang="en-US"/>
               <a:t>Click to edit Master text styles</a:t>
             </a:r>
           </a:p>
@@ -1556,38 +1542,37 @@
           <a:p>
             <a:pPr lvl="0"/>
             <a:r>
-              <a:rPr lang="en-US" smtClean="0"/>
+              <a:rPr lang="en-US"/>
               <a:t>Click to edit Master text styles</a:t>
             </a:r>
           </a:p>
           <a:p>
             <a:pPr lvl="1"/>
             <a:r>
-              <a:rPr lang="en-US" smtClean="0"/>
+              <a:rPr lang="en-US"/>
               <a:t>Second level</a:t>
             </a:r>
           </a:p>
           <a:p>
             <a:pPr lvl="2"/>
             <a:r>
-              <a:rPr lang="en-US" smtClean="0"/>
+              <a:rPr lang="en-US"/>
               <a:t>Third level</a:t>
             </a:r>
           </a:p>
           <a:p>
             <a:pPr lvl="3"/>
             <a:r>
-              <a:rPr lang="en-US" smtClean="0"/>
+              <a:rPr lang="en-US"/>
               <a:t>Fourth level</a:t>
             </a:r>
           </a:p>
           <a:p>
             <a:pPr lvl="4"/>
             <a:r>
-              <a:rPr lang="en-US" smtClean="0"/>
+              <a:rPr lang="en-US"/>
               <a:t>Fifth level</a:t>
             </a:r>
-            <a:endParaRPr lang="en-US"/>
           </a:p>
         </p:txBody>
       </p:sp>
@@ -1608,7 +1593,7 @@
           <a:p>
             <a:fld id="{FC655257-E31F-4E38-8042-08625497D8D8}" type="datetimeFigureOut">
               <a:rPr lang="en-US" smtClean="0"/>
-              <a:t>08-Feb-20</a:t>
+              <a:t>2/10/2020</a:t>
             </a:fld>
             <a:endParaRPr lang="en-US"/>
           </a:p>
@@ -1702,10 +1687,9 @@
           <a:lstStyle/>
           <a:p>
             <a:r>
-              <a:rPr lang="en-US" smtClean="0"/>
+              <a:rPr lang="en-US"/>
               <a:t>Click to edit Master title style</a:t>
             </a:r>
-            <a:endParaRPr lang="en-US"/>
           </a:p>
         </p:txBody>
       </p:sp>
@@ -1726,7 +1710,7 @@
           <a:p>
             <a:fld id="{FC655257-E31F-4E38-8042-08625497D8D8}" type="datetimeFigureOut">
               <a:rPr lang="en-US" smtClean="0"/>
-              <a:t>08-Feb-20</a:t>
+              <a:t>2/10/2020</a:t>
             </a:fld>
             <a:endParaRPr lang="en-US"/>
           </a:p>
@@ -1821,7 +1805,7 @@
           <a:p>
             <a:fld id="{FC655257-E31F-4E38-8042-08625497D8D8}" type="datetimeFigureOut">
               <a:rPr lang="en-US" smtClean="0"/>
-              <a:t>08-Feb-20</a:t>
+              <a:t>2/10/2020</a:t>
             </a:fld>
             <a:endParaRPr lang="en-US"/>
           </a:p>
@@ -1924,10 +1908,9 @@
           </a:lstStyle>
           <a:p>
             <a:r>
-              <a:rPr lang="en-US" smtClean="0"/>
+              <a:rPr lang="en-US"/>
               <a:t>Click to edit Master title style</a:t>
             </a:r>
-            <a:endParaRPr lang="en-US"/>
           </a:p>
         </p:txBody>
       </p:sp>
@@ -1981,38 +1964,37 @@
           <a:p>
             <a:pPr lvl="0"/>
             <a:r>
-              <a:rPr lang="en-US" smtClean="0"/>
+              <a:rPr lang="en-US"/>
               <a:t>Click to edit Master text styles</a:t>
             </a:r>
           </a:p>
           <a:p>
             <a:pPr lvl="1"/>
             <a:r>
-              <a:rPr lang="en-US" smtClean="0"/>
+              <a:rPr lang="en-US"/>
               <a:t>Second level</a:t>
             </a:r>
           </a:p>
           <a:p>
             <a:pPr lvl="2"/>
             <a:r>
-              <a:rPr lang="en-US" smtClean="0"/>
+              <a:rPr lang="en-US"/>
               <a:t>Third level</a:t>
             </a:r>
           </a:p>
           <a:p>
             <a:pPr lvl="3"/>
             <a:r>
-              <a:rPr lang="en-US" smtClean="0"/>
+              <a:rPr lang="en-US"/>
               <a:t>Fourth level</a:t>
             </a:r>
           </a:p>
           <a:p>
             <a:pPr lvl="4"/>
             <a:r>
-              <a:rPr lang="en-US" smtClean="0"/>
+              <a:rPr lang="en-US"/>
               <a:t>Fifth level</a:t>
             </a:r>
-            <a:endParaRPr lang="en-US"/>
           </a:p>
         </p:txBody>
       </p:sp>
@@ -2075,7 +2057,7 @@
           <a:p>
             <a:pPr lvl="0"/>
             <a:r>
-              <a:rPr lang="en-US" smtClean="0"/>
+              <a:rPr lang="en-US"/>
               <a:t>Click to edit Master text styles</a:t>
             </a:r>
           </a:p>
@@ -2098,7 +2080,7 @@
           <a:p>
             <a:fld id="{FC655257-E31F-4E38-8042-08625497D8D8}" type="datetimeFigureOut">
               <a:rPr lang="en-US" smtClean="0"/>
-              <a:t>08-Feb-20</a:t>
+              <a:t>2/10/2020</a:t>
             </a:fld>
             <a:endParaRPr lang="en-US"/>
           </a:p>
@@ -2201,10 +2183,9 @@
           </a:lstStyle>
           <a:p>
             <a:r>
-              <a:rPr lang="en-US" smtClean="0"/>
+              <a:rPr lang="en-US"/>
               <a:t>Click to edit Master title style</a:t>
             </a:r>
-            <a:endParaRPr lang="en-US"/>
           </a:p>
         </p:txBody>
       </p:sp>
@@ -2328,7 +2309,7 @@
           <a:p>
             <a:pPr lvl="0"/>
             <a:r>
-              <a:rPr lang="en-US" smtClean="0"/>
+              <a:rPr lang="en-US"/>
               <a:t>Click to edit Master text styles</a:t>
             </a:r>
           </a:p>
@@ -2351,7 +2332,7 @@
           <a:p>
             <a:fld id="{FC655257-E31F-4E38-8042-08625497D8D8}" type="datetimeFigureOut">
               <a:rPr lang="en-US" smtClean="0"/>
-              <a:t>08-Feb-20</a:t>
+              <a:t>2/10/2020</a:t>
             </a:fld>
             <a:endParaRPr lang="en-US"/>
           </a:p>
@@ -2460,10 +2441,9 @@
           <a:lstStyle/>
           <a:p>
             <a:r>
-              <a:rPr lang="en-US" smtClean="0"/>
+              <a:rPr lang="en-US"/>
               <a:t>Click to edit Master title style</a:t>
             </a:r>
-            <a:endParaRPr lang="en-US"/>
           </a:p>
         </p:txBody>
       </p:sp>
@@ -2494,38 +2474,37 @@
           <a:p>
             <a:pPr lvl="0"/>
             <a:r>
-              <a:rPr lang="en-US" smtClean="0"/>
+              <a:rPr lang="en-US"/>
               <a:t>Click to edit Master text styles</a:t>
             </a:r>
           </a:p>
           <a:p>
             <a:pPr lvl="1"/>
             <a:r>
-              <a:rPr lang="en-US" smtClean="0"/>
+              <a:rPr lang="en-US"/>
               <a:t>Second level</a:t>
             </a:r>
           </a:p>
           <a:p>
             <a:pPr lvl="2"/>
             <a:r>
-              <a:rPr lang="en-US" smtClean="0"/>
+              <a:rPr lang="en-US"/>
               <a:t>Third level</a:t>
             </a:r>
           </a:p>
           <a:p>
             <a:pPr lvl="3"/>
             <a:r>
-              <a:rPr lang="en-US" smtClean="0"/>
+              <a:rPr lang="en-US"/>
               <a:t>Fourth level</a:t>
             </a:r>
           </a:p>
           <a:p>
             <a:pPr lvl="4"/>
             <a:r>
-              <a:rPr lang="en-US" smtClean="0"/>
+              <a:rPr lang="en-US"/>
               <a:t>Fifth level</a:t>
             </a:r>
-            <a:endParaRPr lang="en-US"/>
           </a:p>
         </p:txBody>
       </p:sp>
@@ -2564,7 +2543,7 @@
           <a:p>
             <a:fld id="{FC655257-E31F-4E38-8042-08625497D8D8}" type="datetimeFigureOut">
               <a:rPr lang="en-US" smtClean="0"/>
-              <a:t>08-Feb-20</a:t>
+              <a:t>2/10/2020</a:t>
             </a:fld>
             <a:endParaRPr lang="en-US"/>
           </a:p>
@@ -3034,7 +3013,7 @@
             <a:p>
               <a:pPr algn="ctr"/>
               <a:r>
-                <a:rPr lang="en-US" b="1" dirty="0" smtClean="0">
+                <a:rPr lang="en-US" b="1" dirty="0">
                   <a:solidFill>
                     <a:schemeClr val="tx1"/>
                   </a:solidFill>
@@ -3043,13 +3022,6 @@
                 </a:rPr>
                 <a:t>Grade</a:t>
               </a:r>
-              <a:endParaRPr lang="en-US" b="1" dirty="0">
-                <a:solidFill>
-                  <a:schemeClr val="tx1"/>
-                </a:solidFill>
-                <a:latin typeface="Arial" panose="020B0604020202020204" pitchFamily="34" charset="0"/>
-                <a:cs typeface="Arial" panose="020B0604020202020204" pitchFamily="34" charset="0"/>
-              </a:endParaRPr>
             </a:p>
           </p:txBody>
         </p:sp>
@@ -3095,16 +3067,12 @@
             <a:p>
               <a:pPr algn="ctr"/>
               <a:r>
-                <a:rPr lang="en-US" sz="2800" b="1" dirty="0" smtClean="0">
+                <a:rPr lang="en-US" sz="2800" b="1" dirty="0">
                   <a:latin typeface="Arial" panose="020B0604020202020204" pitchFamily="34" charset="0"/>
                   <a:cs typeface="Arial" panose="020B0604020202020204" pitchFamily="34" charset="0"/>
                 </a:rPr>
                 <a:t>2.  Situational Report</a:t>
               </a:r>
-              <a:endParaRPr lang="en-US" sz="2800" b="1" dirty="0">
-                <a:latin typeface="Arial" panose="020B0604020202020204" pitchFamily="34" charset="0"/>
-                <a:cs typeface="Arial" panose="020B0604020202020204" pitchFamily="34" charset="0"/>
-              </a:endParaRPr>
             </a:p>
           </p:txBody>
         </p:sp>
@@ -3217,7 +3185,7 @@
             <a:p>
               <a:pPr algn="ctr"/>
               <a:r>
-                <a:rPr lang="en-US" b="1" dirty="0" smtClean="0">
+                <a:rPr lang="en-US" b="1" dirty="0">
                   <a:solidFill>
                     <a:schemeClr val="tx1"/>
                   </a:solidFill>
@@ -3229,8 +3197,18 @@
             </a:p>
             <a:p>
               <a:pPr algn="ctr"/>
+              <a:endParaRPr lang="en-US" sz="2400" b="1" dirty="0">
+                <a:solidFill>
+                  <a:srgbClr val="FF0000"/>
+                </a:solidFill>
+                <a:latin typeface="Arial" panose="020B0604020202020204" pitchFamily="34" charset="0"/>
+                <a:cs typeface="Arial" panose="020B0604020202020204" pitchFamily="34" charset="0"/>
+              </a:endParaRPr>
+            </a:p>
+            <a:p>
+              <a:pPr algn="ctr"/>
               <a:r>
-                <a:rPr lang="en-US" sz="2400" b="1" dirty="0" smtClean="0">
+                <a:rPr lang="en-US" sz="2400" b="1" dirty="0">
                   <a:solidFill>
                     <a:srgbClr val="FF0000"/>
                   </a:solidFill>
@@ -3239,13 +3217,6 @@
                 </a:rPr>
                 <a:t>190</a:t>
               </a:r>
-              <a:endParaRPr lang="en-US" sz="2400" b="1" dirty="0">
-                <a:solidFill>
-                  <a:srgbClr val="FF0000"/>
-                </a:solidFill>
-                <a:latin typeface="Arial" panose="020B0604020202020204" pitchFamily="34" charset="0"/>
-                <a:cs typeface="Arial" panose="020B0604020202020204" pitchFamily="34" charset="0"/>
-              </a:endParaRPr>
             </a:p>
           </p:txBody>
         </p:sp>
@@ -3323,7 +3294,7 @@
             <a:p>
               <a:pPr algn="ctr"/>
               <a:r>
-                <a:rPr lang="en-US" b="1" dirty="0" smtClean="0">
+                <a:rPr lang="en-US" b="1" dirty="0">
                   <a:solidFill>
                     <a:schemeClr val="tx1"/>
                   </a:solidFill>
@@ -3335,8 +3306,18 @@
             </a:p>
             <a:p>
               <a:pPr algn="ctr"/>
+              <a:endParaRPr lang="en-US" sz="2400" b="1" dirty="0">
+                <a:solidFill>
+                  <a:srgbClr val="FF0000"/>
+                </a:solidFill>
+                <a:latin typeface="Arial" panose="020B0604020202020204" pitchFamily="34" charset="0"/>
+                <a:cs typeface="Arial" panose="020B0604020202020204" pitchFamily="34" charset="0"/>
+              </a:endParaRPr>
+            </a:p>
+            <a:p>
+              <a:pPr algn="ctr"/>
               <a:r>
-                <a:rPr lang="en-US" sz="2400" b="1" dirty="0" smtClean="0">
+                <a:rPr lang="en-US" sz="2400" b="1" dirty="0">
                   <a:solidFill>
                     <a:srgbClr val="FF0000"/>
                   </a:solidFill>
@@ -3345,13 +3326,6 @@
                 </a:rPr>
                 <a:t>37</a:t>
               </a:r>
-              <a:endParaRPr lang="en-US" sz="2400" b="1" dirty="0">
-                <a:solidFill>
-                  <a:srgbClr val="FF0000"/>
-                </a:solidFill>
-                <a:latin typeface="Arial" panose="020B0604020202020204" pitchFamily="34" charset="0"/>
-                <a:cs typeface="Arial" panose="020B0604020202020204" pitchFamily="34" charset="0"/>
-              </a:endParaRPr>
             </a:p>
           </p:txBody>
         </p:sp>
@@ -3422,7 +3396,7 @@
             <a:p>
               <a:pPr algn="ctr"/>
               <a:r>
-                <a:rPr lang="en-US" b="1" dirty="0" smtClean="0">
+                <a:rPr lang="en-US" b="1" dirty="0">
                   <a:solidFill>
                     <a:schemeClr val="tx1"/>
                   </a:solidFill>
@@ -3434,8 +3408,18 @@
             </a:p>
             <a:p>
               <a:pPr algn="ctr"/>
+              <a:endParaRPr lang="en-US" sz="2400" b="1" dirty="0">
+                <a:solidFill>
+                  <a:srgbClr val="FF0000"/>
+                </a:solidFill>
+                <a:latin typeface="Arial" panose="020B0604020202020204" pitchFamily="34" charset="0"/>
+                <a:cs typeface="Arial" panose="020B0604020202020204" pitchFamily="34" charset="0"/>
+              </a:endParaRPr>
+            </a:p>
+            <a:p>
+              <a:pPr algn="ctr"/>
               <a:r>
-                <a:rPr lang="en-US" sz="2400" b="1" dirty="0" smtClean="0">
+                <a:rPr lang="en-US" sz="2400" b="1" dirty="0">
                   <a:solidFill>
                     <a:srgbClr val="FF0000"/>
                   </a:solidFill>
@@ -3444,13 +3428,6 @@
                 </a:rPr>
                 <a:t>24%</a:t>
               </a:r>
-              <a:endParaRPr lang="en-US" sz="2400" b="1" dirty="0">
-                <a:solidFill>
-                  <a:srgbClr val="FF0000"/>
-                </a:solidFill>
-                <a:latin typeface="Arial" panose="020B0604020202020204" pitchFamily="34" charset="0"/>
-                <a:cs typeface="Arial" panose="020B0604020202020204" pitchFamily="34" charset="0"/>
-              </a:endParaRPr>
             </a:p>
           </p:txBody>
         </p:sp>
@@ -3462,7 +3439,7 @@
           </p:nvSpPr>
           <p:spPr>
             <a:xfrm>
-              <a:off x="5994399" y="2148110"/>
+              <a:off x="5994399" y="2305962"/>
               <a:ext cx="532282" cy="493486"/>
             </a:xfrm>
             <a:prstGeom prst="ellipse">
@@ -3499,16 +3476,12 @@
             <a:p>
               <a:pPr algn="ctr"/>
               <a:r>
-                <a:rPr lang="en-US" sz="2400" b="1" dirty="0" smtClean="0">
+                <a:rPr lang="en-US" sz="2400" b="1" dirty="0">
                   <a:latin typeface="Arial" panose="020B0604020202020204" pitchFamily="34" charset="0"/>
                   <a:cs typeface="Arial" panose="020B0604020202020204" pitchFamily="34" charset="0"/>
                 </a:rPr>
                 <a:t>2</a:t>
               </a:r>
-              <a:endParaRPr lang="en-US" sz="2400" b="1" dirty="0">
-                <a:latin typeface="Arial" panose="020B0604020202020204" pitchFamily="34" charset="0"/>
-                <a:cs typeface="Arial" panose="020B0604020202020204" pitchFamily="34" charset="0"/>
-              </a:endParaRPr>
             </a:p>
           </p:txBody>
         </p:sp>
@@ -3523,13 +3496,6 @@
   <p:clrMapOvr>
     <a:masterClrMapping/>
   </p:clrMapOvr>
-  <p:timing>
-    <p:tnLst>
-      <p:par>
-        <p:cTn id="1" dur="indefinite" restart="never" nodeType="tmRoot"/>
-      </p:par>
-    </p:tnLst>
-  </p:timing>
 </p:sld>
 </file>
 

</xml_diff>

<commit_message>
added other arrow headings
</commit_message>
<xml_diff>
--- a/Resources/arrow_image.pptx
+++ b/Resources/arrow_image.pptx
@@ -6,6 +6,7 @@
   </p:sldMasterIdLst>
   <p:sldIdLst>
     <p:sldId id="256" r:id="rId2"/>
+    <p:sldId id="257" r:id="rId3"/>
   </p:sldIdLst>
   <p:sldSz cx="12192000" cy="6858000"/>
   <p:notesSz cx="6858000" cy="9144000"/>
@@ -241,7 +242,7 @@
           <a:p>
             <a:fld id="{FC655257-E31F-4E38-8042-08625497D8D8}" type="datetimeFigureOut">
               <a:rPr lang="en-US" smtClean="0"/>
-              <a:t>10-Feb-20</a:t>
+              <a:t>13-Feb-20</a:t>
             </a:fld>
             <a:endParaRPr lang="en-US"/>
           </a:p>
@@ -409,7 +410,7 @@
           <a:p>
             <a:fld id="{FC655257-E31F-4E38-8042-08625497D8D8}" type="datetimeFigureOut">
               <a:rPr lang="en-US" smtClean="0"/>
-              <a:t>10-Feb-20</a:t>
+              <a:t>13-Feb-20</a:t>
             </a:fld>
             <a:endParaRPr lang="en-US"/>
           </a:p>
@@ -587,7 +588,7 @@
           <a:p>
             <a:fld id="{FC655257-E31F-4E38-8042-08625497D8D8}" type="datetimeFigureOut">
               <a:rPr lang="en-US" smtClean="0"/>
-              <a:t>10-Feb-20</a:t>
+              <a:t>13-Feb-20</a:t>
             </a:fld>
             <a:endParaRPr lang="en-US"/>
           </a:p>
@@ -755,7 +756,7 @@
           <a:p>
             <a:fld id="{FC655257-E31F-4E38-8042-08625497D8D8}" type="datetimeFigureOut">
               <a:rPr lang="en-US" smtClean="0"/>
-              <a:t>10-Feb-20</a:t>
+              <a:t>13-Feb-20</a:t>
             </a:fld>
             <a:endParaRPr lang="en-US"/>
           </a:p>
@@ -1000,7 +1001,7 @@
           <a:p>
             <a:fld id="{FC655257-E31F-4E38-8042-08625497D8D8}" type="datetimeFigureOut">
               <a:rPr lang="en-US" smtClean="0"/>
-              <a:t>10-Feb-20</a:t>
+              <a:t>13-Feb-20</a:t>
             </a:fld>
             <a:endParaRPr lang="en-US"/>
           </a:p>
@@ -1229,7 +1230,7 @@
           <a:p>
             <a:fld id="{FC655257-E31F-4E38-8042-08625497D8D8}" type="datetimeFigureOut">
               <a:rPr lang="en-US" smtClean="0"/>
-              <a:t>10-Feb-20</a:t>
+              <a:t>13-Feb-20</a:t>
             </a:fld>
             <a:endParaRPr lang="en-US"/>
           </a:p>
@@ -1593,7 +1594,7 @@
           <a:p>
             <a:fld id="{FC655257-E31F-4E38-8042-08625497D8D8}" type="datetimeFigureOut">
               <a:rPr lang="en-US" smtClean="0"/>
-              <a:t>10-Feb-20</a:t>
+              <a:t>13-Feb-20</a:t>
             </a:fld>
             <a:endParaRPr lang="en-US"/>
           </a:p>
@@ -1710,7 +1711,7 @@
           <a:p>
             <a:fld id="{FC655257-E31F-4E38-8042-08625497D8D8}" type="datetimeFigureOut">
               <a:rPr lang="en-US" smtClean="0"/>
-              <a:t>10-Feb-20</a:t>
+              <a:t>13-Feb-20</a:t>
             </a:fld>
             <a:endParaRPr lang="en-US"/>
           </a:p>
@@ -1805,7 +1806,7 @@
           <a:p>
             <a:fld id="{FC655257-E31F-4E38-8042-08625497D8D8}" type="datetimeFigureOut">
               <a:rPr lang="en-US" smtClean="0"/>
-              <a:t>10-Feb-20</a:t>
+              <a:t>13-Feb-20</a:t>
             </a:fld>
             <a:endParaRPr lang="en-US"/>
           </a:p>
@@ -2080,7 +2081,7 @@
           <a:p>
             <a:fld id="{FC655257-E31F-4E38-8042-08625497D8D8}" type="datetimeFigureOut">
               <a:rPr lang="en-US" smtClean="0"/>
-              <a:t>10-Feb-20</a:t>
+              <a:t>13-Feb-20</a:t>
             </a:fld>
             <a:endParaRPr lang="en-US"/>
           </a:p>
@@ -2332,7 +2333,7 @@
           <a:p>
             <a:fld id="{FC655257-E31F-4E38-8042-08625497D8D8}" type="datetimeFigureOut">
               <a:rPr lang="en-US" smtClean="0"/>
-              <a:t>10-Feb-20</a:t>
+              <a:t>13-Feb-20</a:t>
             </a:fld>
             <a:endParaRPr lang="en-US"/>
           </a:p>
@@ -2543,7 +2544,7 @@
           <a:p>
             <a:fld id="{FC655257-E31F-4E38-8042-08625497D8D8}" type="datetimeFigureOut">
               <a:rPr lang="en-US" smtClean="0"/>
-              <a:t>10-Feb-20</a:t>
+              <a:t>13-Feb-20</a:t>
             </a:fld>
             <a:endParaRPr lang="en-US"/>
           </a:p>
@@ -2956,7 +2957,137 @@
         </p:nvGrpSpPr>
         <p:grpSpPr>
           <a:xfrm>
-            <a:off x="203200" y="1754505"/>
+            <a:off x="261257" y="2302047"/>
+            <a:ext cx="11784970" cy="1205998"/>
+            <a:chOff x="203200" y="1753702"/>
+            <a:chExt cx="5800816" cy="1134641"/>
+          </a:xfrm>
+        </p:grpSpPr>
+        <p:sp>
+          <p:nvSpPr>
+            <p:cNvPr id="4" name="Pentagon 3"/>
+            <p:cNvSpPr/>
+            <p:nvPr/>
+          </p:nvSpPr>
+          <p:spPr>
+            <a:xfrm>
+              <a:off x="203200" y="1753702"/>
+              <a:ext cx="5257700" cy="1134641"/>
+            </a:xfrm>
+            <a:prstGeom prst="homePlate">
+              <a:avLst/>
+            </a:prstGeom>
+            <a:solidFill>
+              <a:schemeClr val="accent1">
+                <a:lumMod val="75000"/>
+              </a:schemeClr>
+            </a:solidFill>
+          </p:spPr>
+          <p:style>
+            <a:lnRef idx="2">
+              <a:schemeClr val="accent1">
+                <a:shade val="50000"/>
+              </a:schemeClr>
+            </a:lnRef>
+            <a:fillRef idx="1">
+              <a:schemeClr val="accent1"/>
+            </a:fillRef>
+            <a:effectRef idx="0">
+              <a:schemeClr val="accent1"/>
+            </a:effectRef>
+            <a:fontRef idx="minor">
+              <a:schemeClr val="lt1"/>
+            </a:fontRef>
+          </p:style>
+          <p:txBody>
+            <a:bodyPr rtlCol="0" anchor="ctr"/>
+            <a:lstStyle/>
+            <a:p>
+              <a:pPr algn="ctr"/>
+              <a:r>
+                <a:rPr lang="en-US" sz="2800" b="1" dirty="0">
+                  <a:latin typeface="Arial" panose="020B0604020202020204" pitchFamily="34" charset="0"/>
+                  <a:cs typeface="Arial" panose="020B0604020202020204" pitchFamily="34" charset="0"/>
+                </a:rPr>
+                <a:t>Figure 1:Gender distribution of the pneumonic plague outbreak in Northeast India 12 Oct - 09 Dec 2019  </a:t>
+              </a:r>
+            </a:p>
+          </p:txBody>
+        </p:sp>
+        <p:sp>
+          <p:nvSpPr>
+            <p:cNvPr id="6" name="Chevron 5"/>
+            <p:cNvSpPr/>
+            <p:nvPr/>
+          </p:nvSpPr>
+          <p:spPr>
+            <a:xfrm>
+              <a:off x="5173101" y="1753702"/>
+              <a:ext cx="830915" cy="1134641"/>
+            </a:xfrm>
+            <a:prstGeom prst="chevron">
+              <a:avLst/>
+            </a:prstGeom>
+            <a:solidFill>
+              <a:schemeClr val="accent1">
+                <a:lumMod val="60000"/>
+                <a:lumOff val="40000"/>
+              </a:schemeClr>
+            </a:solidFill>
+            <a:ln>
+              <a:solidFill>
+                <a:schemeClr val="accent1">
+                  <a:lumMod val="60000"/>
+                  <a:lumOff val="40000"/>
+                </a:schemeClr>
+              </a:solidFill>
+            </a:ln>
+          </p:spPr>
+          <p:style>
+            <a:lnRef idx="2">
+              <a:schemeClr val="accent1">
+                <a:shade val="50000"/>
+              </a:schemeClr>
+            </a:lnRef>
+            <a:fillRef idx="1">
+              <a:schemeClr val="accent1"/>
+            </a:fillRef>
+            <a:effectRef idx="0">
+              <a:schemeClr val="accent1"/>
+            </a:effectRef>
+            <a:fontRef idx="minor">
+              <a:schemeClr val="lt1"/>
+            </a:fontRef>
+          </p:style>
+          <p:txBody>
+            <a:bodyPr rtlCol="0" anchor="ctr"/>
+            <a:lstStyle/>
+            <a:p>
+              <a:pPr algn="ctr"/>
+              <a:endParaRPr lang="en-US">
+                <a:solidFill>
+                  <a:schemeClr val="tx1"/>
+                </a:solidFill>
+              </a:endParaRPr>
+            </a:p>
+          </p:txBody>
+        </p:sp>
+      </p:grpSp>
+      <p:grpSp>
+        <p:nvGrpSpPr>
+          <p:cNvPr id="11" name="Group 10">
+            <a:extLst>
+              <a:ext uri="{FF2B5EF4-FFF2-40B4-BE49-F238E27FC236}">
+                <a16:creationId xmlns:a16="http://schemas.microsoft.com/office/drawing/2014/main" id="{498123D8-0999-4D42-9133-224F90DBB287}"/>
+              </a:ext>
+            </a:extLst>
+          </p:cNvPr>
+          <p:cNvGrpSpPr/>
+          <p:nvPr/>
+        </p:nvGrpSpPr>
+        <p:grpSpPr>
+          <a:xfrm>
+            <a:off x="261257" y="850175"/>
             <a:ext cx="11669486" cy="1206407"/>
             <a:chOff x="203200" y="1753317"/>
             <a:chExt cx="10363200" cy="1135026"/>
@@ -2964,7 +3095,13 @@
         </p:grpSpPr>
         <p:sp>
           <p:nvSpPr>
-            <p:cNvPr id="7" name="Rectangle 6"/>
+            <p:cNvPr id="13" name="Rectangle 12">
+              <a:extLst>
+                <a:ext uri="{FF2B5EF4-FFF2-40B4-BE49-F238E27FC236}">
+                  <a16:creationId xmlns:a16="http://schemas.microsoft.com/office/drawing/2014/main" id="{BA942368-1106-42A9-A878-BADA755C9DEB}"/>
+                </a:ext>
+              </a:extLst>
+            </p:cNvPr>
             <p:cNvSpPr/>
             <p:nvPr/>
           </p:nvSpPr>
@@ -3027,7 +3164,13 @@
         </p:sp>
         <p:sp>
           <p:nvSpPr>
-            <p:cNvPr id="4" name="Pentagon 3"/>
+            <p:cNvPr id="15" name="Pentagon 3">
+              <a:extLst>
+                <a:ext uri="{FF2B5EF4-FFF2-40B4-BE49-F238E27FC236}">
+                  <a16:creationId xmlns:a16="http://schemas.microsoft.com/office/drawing/2014/main" id="{F7D16F89-8756-4575-B7D9-5EA4A582CF23}"/>
+                </a:ext>
+              </a:extLst>
+            </p:cNvPr>
             <p:cNvSpPr/>
             <p:nvPr/>
           </p:nvSpPr>
@@ -3071,20 +3214,26 @@
                   <a:latin typeface="Arial" panose="020B0604020202020204" pitchFamily="34" charset="0"/>
                   <a:cs typeface="Arial" panose="020B0604020202020204" pitchFamily="34" charset="0"/>
                 </a:rPr>
-                <a:t>2.  Situational Report</a:t>
+                <a:t>Situational Report</a:t>
               </a:r>
             </a:p>
           </p:txBody>
         </p:sp>
         <p:sp>
           <p:nvSpPr>
-            <p:cNvPr id="6" name="Chevron 5"/>
+            <p:cNvPr id="16" name="Chevron 5">
+              <a:extLst>
+                <a:ext uri="{FF2B5EF4-FFF2-40B4-BE49-F238E27FC236}">
+                  <a16:creationId xmlns:a16="http://schemas.microsoft.com/office/drawing/2014/main" id="{BD0DC667-6294-48F2-8ABC-E975FE7940C9}"/>
+                </a:ext>
+              </a:extLst>
+            </p:cNvPr>
             <p:cNvSpPr/>
             <p:nvPr/>
           </p:nvSpPr>
           <p:spPr>
             <a:xfrm>
-              <a:off x="3672115" y="1753702"/>
+              <a:off x="3672115" y="1753698"/>
               <a:ext cx="2234056" cy="1134641"/>
             </a:xfrm>
             <a:prstGeom prst="chevron">
@@ -3136,7 +3285,13 @@
         </p:sp>
         <p:sp>
           <p:nvSpPr>
-            <p:cNvPr id="8" name="Rectangle 7"/>
+            <p:cNvPr id="17" name="Rectangle 16">
+              <a:extLst>
+                <a:ext uri="{FF2B5EF4-FFF2-40B4-BE49-F238E27FC236}">
+                  <a16:creationId xmlns:a16="http://schemas.microsoft.com/office/drawing/2014/main" id="{FAFA0244-E01D-45DD-A9E4-34B9B87FAD0D}"/>
+                </a:ext>
+              </a:extLst>
+            </p:cNvPr>
             <p:cNvSpPr/>
             <p:nvPr/>
           </p:nvSpPr>
@@ -3222,7 +3377,13 @@
         </p:sp>
         <p:sp>
           <p:nvSpPr>
-            <p:cNvPr id="9" name="Rectangle 8"/>
+            <p:cNvPr id="18" name="Rectangle 17">
+              <a:extLst>
+                <a:ext uri="{FF2B5EF4-FFF2-40B4-BE49-F238E27FC236}">
+                  <a16:creationId xmlns:a16="http://schemas.microsoft.com/office/drawing/2014/main" id="{991D39F8-DB65-49AA-95A0-92C9D7932426}"/>
+                </a:ext>
+              </a:extLst>
+            </p:cNvPr>
             <p:cNvSpPr/>
             <p:nvPr/>
           </p:nvSpPr>
@@ -3331,7 +3492,13 @@
         </p:sp>
         <p:sp>
           <p:nvSpPr>
-            <p:cNvPr id="10" name="Rectangle 9"/>
+            <p:cNvPr id="19" name="Rectangle 18">
+              <a:extLst>
+                <a:ext uri="{FF2B5EF4-FFF2-40B4-BE49-F238E27FC236}">
+                  <a16:creationId xmlns:a16="http://schemas.microsoft.com/office/drawing/2014/main" id="{36F29332-95C7-4A2D-BA22-CCEB9CD7985A}"/>
+                </a:ext>
+              </a:extLst>
+            </p:cNvPr>
             <p:cNvSpPr/>
             <p:nvPr/>
           </p:nvSpPr>
@@ -3419,7 +3586,7 @@
             <a:p>
               <a:pPr algn="ctr"/>
               <a:r>
-                <a:rPr lang="en-US" sz="2400" b="1" smtClean="0">
+                <a:rPr lang="en-US" sz="2400" b="1">
                   <a:solidFill>
                     <a:srgbClr val="FF0000"/>
                   </a:solidFill>
@@ -3440,7 +3607,13 @@
         </p:sp>
         <p:sp>
           <p:nvSpPr>
-            <p:cNvPr id="12" name="Oval 11"/>
+            <p:cNvPr id="20" name="Oval 19">
+              <a:extLst>
+                <a:ext uri="{FF2B5EF4-FFF2-40B4-BE49-F238E27FC236}">
+                  <a16:creationId xmlns:a16="http://schemas.microsoft.com/office/drawing/2014/main" id="{540E7A8D-F53C-4451-8F3C-CAACA5D02631}"/>
+                </a:ext>
+              </a:extLst>
+            </p:cNvPr>
             <p:cNvSpPr/>
             <p:nvPr/>
           </p:nvSpPr>
@@ -3493,10 +3666,645 @@
           </p:txBody>
         </p:sp>
       </p:grpSp>
+      <p:sp>
+        <p:nvSpPr>
+          <p:cNvPr id="2" name="Rectangle 1">
+            <a:extLst>
+              <a:ext uri="{FF2B5EF4-FFF2-40B4-BE49-F238E27FC236}">
+                <a16:creationId xmlns:a16="http://schemas.microsoft.com/office/drawing/2014/main" id="{1B7A9F6A-D851-4974-8DD5-08B07F9AFD18}"/>
+              </a:ext>
+            </a:extLst>
+          </p:cNvPr>
+          <p:cNvSpPr/>
+          <p:nvPr/>
+        </p:nvSpPr>
+        <p:spPr>
+          <a:xfrm>
+            <a:off x="2322121" y="328443"/>
+            <a:ext cx="7272568" cy="369332"/>
+          </a:xfrm>
+          <a:prstGeom prst="rect">
+            <a:avLst/>
+          </a:prstGeom>
+        </p:spPr>
+        <p:txBody>
+          <a:bodyPr wrap="none">
+            <a:spAutoFit/>
+          </a:bodyPr>
+          <a:lstStyle/>
+          <a:p>
+            <a:r>
+              <a:rPr lang="en-US" dirty="0">
+                <a:latin typeface="LMRoman17-Regular"/>
+              </a:rPr>
+              <a:t>SITUATIONL REPORT: PNEUMONIC PLAGUE OUTBREAK IN NORTHEAST INDIA</a:t>
+            </a:r>
+            <a:endParaRPr lang="en-US" dirty="0"/>
+          </a:p>
+        </p:txBody>
+      </p:sp>
+      <p:grpSp>
+        <p:nvGrpSpPr>
+          <p:cNvPr id="24" name="Group 23">
+            <a:extLst>
+              <a:ext uri="{FF2B5EF4-FFF2-40B4-BE49-F238E27FC236}">
+                <a16:creationId xmlns:a16="http://schemas.microsoft.com/office/drawing/2014/main" id="{A4C2911C-8D2A-4E98-B1D4-E6063C28F2BB}"/>
+              </a:ext>
+            </a:extLst>
+          </p:cNvPr>
+          <p:cNvGrpSpPr/>
+          <p:nvPr/>
+        </p:nvGrpSpPr>
+        <p:grpSpPr>
+          <a:xfrm>
+            <a:off x="261257" y="3660849"/>
+            <a:ext cx="11784970" cy="1205999"/>
+            <a:chOff x="203200" y="1753701"/>
+            <a:chExt cx="5800816" cy="1134642"/>
+          </a:xfrm>
+        </p:grpSpPr>
+        <p:sp>
+          <p:nvSpPr>
+            <p:cNvPr id="25" name="Pentagon 3">
+              <a:extLst>
+                <a:ext uri="{FF2B5EF4-FFF2-40B4-BE49-F238E27FC236}">
+                  <a16:creationId xmlns:a16="http://schemas.microsoft.com/office/drawing/2014/main" id="{8CE0D642-AFE7-4408-ADED-D2CA3D2F5710}"/>
+                </a:ext>
+              </a:extLst>
+            </p:cNvPr>
+            <p:cNvSpPr/>
+            <p:nvPr/>
+          </p:nvSpPr>
+          <p:spPr>
+            <a:xfrm>
+              <a:off x="203200" y="1753701"/>
+              <a:ext cx="5257700" cy="1134641"/>
+            </a:xfrm>
+            <a:prstGeom prst="homePlate">
+              <a:avLst/>
+            </a:prstGeom>
+            <a:solidFill>
+              <a:schemeClr val="accent1">
+                <a:lumMod val="75000"/>
+              </a:schemeClr>
+            </a:solidFill>
+          </p:spPr>
+          <p:style>
+            <a:lnRef idx="2">
+              <a:schemeClr val="accent1">
+                <a:shade val="50000"/>
+              </a:schemeClr>
+            </a:lnRef>
+            <a:fillRef idx="1">
+              <a:schemeClr val="accent1"/>
+            </a:fillRef>
+            <a:effectRef idx="0">
+              <a:schemeClr val="accent1"/>
+            </a:effectRef>
+            <a:fontRef idx="minor">
+              <a:schemeClr val="lt1"/>
+            </a:fontRef>
+          </p:style>
+          <p:txBody>
+            <a:bodyPr rtlCol="0" anchor="ctr"/>
+            <a:lstStyle/>
+            <a:p>
+              <a:pPr algn="ctr"/>
+              <a:r>
+                <a:rPr lang="en-US" sz="2800" b="1" dirty="0">
+                  <a:latin typeface="Arial" panose="020B0604020202020204" pitchFamily="34" charset="0"/>
+                  <a:cs typeface="Arial" panose="020B0604020202020204" pitchFamily="34" charset="0"/>
+                </a:rPr>
+                <a:t>Figure 2: Age distribution of the pneumonic plague outbreak in Northeast India 12 Oct - 09 Dec 2019 </a:t>
+              </a:r>
+            </a:p>
+          </p:txBody>
+        </p:sp>
+        <p:sp>
+          <p:nvSpPr>
+            <p:cNvPr id="26" name="Chevron 5">
+              <a:extLst>
+                <a:ext uri="{FF2B5EF4-FFF2-40B4-BE49-F238E27FC236}">
+                  <a16:creationId xmlns:a16="http://schemas.microsoft.com/office/drawing/2014/main" id="{46DBF7AA-413D-4739-97A2-EADFCA9504E6}"/>
+                </a:ext>
+              </a:extLst>
+            </p:cNvPr>
+            <p:cNvSpPr/>
+            <p:nvPr/>
+          </p:nvSpPr>
+          <p:spPr>
+            <a:xfrm>
+              <a:off x="5173101" y="1753702"/>
+              <a:ext cx="830915" cy="1134641"/>
+            </a:xfrm>
+            <a:prstGeom prst="chevron">
+              <a:avLst/>
+            </a:prstGeom>
+            <a:solidFill>
+              <a:schemeClr val="accent1">
+                <a:lumMod val="60000"/>
+                <a:lumOff val="40000"/>
+              </a:schemeClr>
+            </a:solidFill>
+            <a:ln>
+              <a:solidFill>
+                <a:schemeClr val="accent1">
+                  <a:lumMod val="60000"/>
+                  <a:lumOff val="40000"/>
+                </a:schemeClr>
+              </a:solidFill>
+            </a:ln>
+          </p:spPr>
+          <p:style>
+            <a:lnRef idx="2">
+              <a:schemeClr val="accent1">
+                <a:shade val="50000"/>
+              </a:schemeClr>
+            </a:lnRef>
+            <a:fillRef idx="1">
+              <a:schemeClr val="accent1"/>
+            </a:fillRef>
+            <a:effectRef idx="0">
+              <a:schemeClr val="accent1"/>
+            </a:effectRef>
+            <a:fontRef idx="minor">
+              <a:schemeClr val="lt1"/>
+            </a:fontRef>
+          </p:style>
+          <p:txBody>
+            <a:bodyPr rtlCol="0" anchor="ctr"/>
+            <a:lstStyle/>
+            <a:p>
+              <a:pPr algn="ctr"/>
+              <a:endParaRPr lang="en-US">
+                <a:solidFill>
+                  <a:schemeClr val="tx1"/>
+                </a:solidFill>
+              </a:endParaRPr>
+            </a:p>
+          </p:txBody>
+        </p:sp>
+      </p:grpSp>
+      <p:grpSp>
+        <p:nvGrpSpPr>
+          <p:cNvPr id="29" name="Group 28">
+            <a:extLst>
+              <a:ext uri="{FF2B5EF4-FFF2-40B4-BE49-F238E27FC236}">
+                <a16:creationId xmlns:a16="http://schemas.microsoft.com/office/drawing/2014/main" id="{82C2262C-01F9-49C8-837A-72BA0ABBF604}"/>
+              </a:ext>
+            </a:extLst>
+          </p:cNvPr>
+          <p:cNvGrpSpPr/>
+          <p:nvPr/>
+        </p:nvGrpSpPr>
+        <p:grpSpPr>
+          <a:xfrm>
+            <a:off x="261257" y="5112317"/>
+            <a:ext cx="11784970" cy="1205999"/>
+            <a:chOff x="203200" y="1753702"/>
+            <a:chExt cx="5800816" cy="1134642"/>
+          </a:xfrm>
+        </p:grpSpPr>
+        <p:sp>
+          <p:nvSpPr>
+            <p:cNvPr id="30" name="Pentagon 3">
+              <a:extLst>
+                <a:ext uri="{FF2B5EF4-FFF2-40B4-BE49-F238E27FC236}">
+                  <a16:creationId xmlns:a16="http://schemas.microsoft.com/office/drawing/2014/main" id="{7D3A111E-9672-4013-9C44-995A53DE8388}"/>
+                </a:ext>
+              </a:extLst>
+            </p:cNvPr>
+            <p:cNvSpPr/>
+            <p:nvPr/>
+          </p:nvSpPr>
+          <p:spPr>
+            <a:xfrm>
+              <a:off x="203200" y="1753703"/>
+              <a:ext cx="5257700" cy="1134641"/>
+            </a:xfrm>
+            <a:prstGeom prst="homePlate">
+              <a:avLst/>
+            </a:prstGeom>
+            <a:solidFill>
+              <a:schemeClr val="accent1">
+                <a:lumMod val="75000"/>
+              </a:schemeClr>
+            </a:solidFill>
+          </p:spPr>
+          <p:style>
+            <a:lnRef idx="2">
+              <a:schemeClr val="accent1">
+                <a:shade val="50000"/>
+              </a:schemeClr>
+            </a:lnRef>
+            <a:fillRef idx="1">
+              <a:schemeClr val="accent1"/>
+            </a:fillRef>
+            <a:effectRef idx="0">
+              <a:schemeClr val="accent1"/>
+            </a:effectRef>
+            <a:fontRef idx="minor">
+              <a:schemeClr val="lt1"/>
+            </a:fontRef>
+          </p:style>
+          <p:txBody>
+            <a:bodyPr rtlCol="0" anchor="ctr"/>
+            <a:lstStyle/>
+            <a:p>
+              <a:pPr algn="ctr"/>
+              <a:r>
+                <a:rPr lang="en-US" sz="2800" b="1" dirty="0">
+                  <a:latin typeface="Arial" panose="020B0604020202020204" pitchFamily="34" charset="0"/>
+                  <a:cs typeface="Arial" panose="020B0604020202020204" pitchFamily="34" charset="0"/>
+                </a:rPr>
+                <a:t>    Figure 3: Mortality due to pneumonic plague outbreak in Northeast India 12 Oct - 09 Dec 2019</a:t>
+              </a:r>
+            </a:p>
+          </p:txBody>
+        </p:sp>
+        <p:sp>
+          <p:nvSpPr>
+            <p:cNvPr id="31" name="Chevron 5">
+              <a:extLst>
+                <a:ext uri="{FF2B5EF4-FFF2-40B4-BE49-F238E27FC236}">
+                  <a16:creationId xmlns:a16="http://schemas.microsoft.com/office/drawing/2014/main" id="{5685238B-08E6-46D5-9BF2-2186E4C26112}"/>
+                </a:ext>
+              </a:extLst>
+            </p:cNvPr>
+            <p:cNvSpPr/>
+            <p:nvPr/>
+          </p:nvSpPr>
+          <p:spPr>
+            <a:xfrm>
+              <a:off x="5173101" y="1753702"/>
+              <a:ext cx="830915" cy="1134641"/>
+            </a:xfrm>
+            <a:prstGeom prst="chevron">
+              <a:avLst/>
+            </a:prstGeom>
+            <a:solidFill>
+              <a:schemeClr val="accent1">
+                <a:lumMod val="60000"/>
+                <a:lumOff val="40000"/>
+              </a:schemeClr>
+            </a:solidFill>
+            <a:ln>
+              <a:solidFill>
+                <a:schemeClr val="accent1">
+                  <a:lumMod val="60000"/>
+                  <a:lumOff val="40000"/>
+                </a:schemeClr>
+              </a:solidFill>
+            </a:ln>
+          </p:spPr>
+          <p:style>
+            <a:lnRef idx="2">
+              <a:schemeClr val="accent1">
+                <a:shade val="50000"/>
+              </a:schemeClr>
+            </a:lnRef>
+            <a:fillRef idx="1">
+              <a:schemeClr val="accent1"/>
+            </a:fillRef>
+            <a:effectRef idx="0">
+              <a:schemeClr val="accent1"/>
+            </a:effectRef>
+            <a:fontRef idx="minor">
+              <a:schemeClr val="lt1"/>
+            </a:fontRef>
+          </p:style>
+          <p:txBody>
+            <a:bodyPr rtlCol="0" anchor="ctr"/>
+            <a:lstStyle/>
+            <a:p>
+              <a:pPr algn="ctr"/>
+              <a:endParaRPr lang="en-US">
+                <a:solidFill>
+                  <a:schemeClr val="tx1"/>
+                </a:solidFill>
+              </a:endParaRPr>
+            </a:p>
+          </p:txBody>
+        </p:sp>
+      </p:grpSp>
     </p:spTree>
     <p:extLst>
       <p:ext uri="{BB962C8B-B14F-4D97-AF65-F5344CB8AC3E}">
         <p14:creationId xmlns:p14="http://schemas.microsoft.com/office/powerpoint/2010/main" val="4135325453"/>
+      </p:ext>
+    </p:extLst>
+  </p:cSld>
+  <p:clrMapOvr>
+    <a:masterClrMapping/>
+  </p:clrMapOvr>
+</p:sld>
+</file>
+
+<file path=ppt/slides/slide2.xml><?xml version="1.0" encoding="utf-8"?>
+<p:sld xmlns:a="http://schemas.openxmlformats.org/drawingml/2006/main" xmlns:r="http://schemas.openxmlformats.org/officeDocument/2006/relationships" xmlns:p="http://schemas.openxmlformats.org/presentationml/2006/main">
+  <p:cSld>
+    <p:spTree>
+      <p:nvGrpSpPr>
+        <p:cNvPr id="1" name=""/>
+        <p:cNvGrpSpPr/>
+        <p:nvPr/>
+      </p:nvGrpSpPr>
+      <p:grpSpPr>
+        <a:xfrm>
+          <a:off x="0" y="0"/>
+          <a:ext cx="0" cy="0"/>
+          <a:chOff x="0" y="0"/>
+          <a:chExt cx="0" cy="0"/>
+        </a:xfrm>
+      </p:grpSpPr>
+      <p:grpSp>
+        <p:nvGrpSpPr>
+          <p:cNvPr id="2" name="Group 1">
+            <a:extLst>
+              <a:ext uri="{FF2B5EF4-FFF2-40B4-BE49-F238E27FC236}">
+                <a16:creationId xmlns:a16="http://schemas.microsoft.com/office/drawing/2014/main" id="{54713BD6-F492-4A2B-88DE-E3EAD0220B26}"/>
+              </a:ext>
+            </a:extLst>
+          </p:cNvPr>
+          <p:cNvGrpSpPr/>
+          <p:nvPr/>
+        </p:nvGrpSpPr>
+        <p:grpSpPr>
+          <a:xfrm>
+            <a:off x="203515" y="817804"/>
+            <a:ext cx="11784970" cy="798961"/>
+            <a:chOff x="203200" y="1753702"/>
+            <a:chExt cx="5800816" cy="1134641"/>
+          </a:xfrm>
+        </p:grpSpPr>
+        <p:sp>
+          <p:nvSpPr>
+            <p:cNvPr id="3" name="Pentagon 3">
+              <a:extLst>
+                <a:ext uri="{FF2B5EF4-FFF2-40B4-BE49-F238E27FC236}">
+                  <a16:creationId xmlns:a16="http://schemas.microsoft.com/office/drawing/2014/main" id="{995265E5-F021-4EAE-8769-60E90F13EFDD}"/>
+                </a:ext>
+              </a:extLst>
+            </p:cNvPr>
+            <p:cNvSpPr/>
+            <p:nvPr/>
+          </p:nvSpPr>
+          <p:spPr>
+            <a:xfrm>
+              <a:off x="203200" y="1753702"/>
+              <a:ext cx="5257700" cy="1134641"/>
+            </a:xfrm>
+            <a:prstGeom prst="homePlate">
+              <a:avLst/>
+            </a:prstGeom>
+            <a:solidFill>
+              <a:schemeClr val="accent1">
+                <a:lumMod val="75000"/>
+              </a:schemeClr>
+            </a:solidFill>
+          </p:spPr>
+          <p:style>
+            <a:lnRef idx="2">
+              <a:schemeClr val="accent1">
+                <a:shade val="50000"/>
+              </a:schemeClr>
+            </a:lnRef>
+            <a:fillRef idx="1">
+              <a:schemeClr val="accent1"/>
+            </a:fillRef>
+            <a:effectRef idx="0">
+              <a:schemeClr val="accent1"/>
+            </a:effectRef>
+            <a:fontRef idx="minor">
+              <a:schemeClr val="lt1"/>
+            </a:fontRef>
+          </p:style>
+          <p:txBody>
+            <a:bodyPr rtlCol="0" anchor="ctr"/>
+            <a:lstStyle/>
+            <a:p>
+              <a:pPr algn="ctr"/>
+              <a:r>
+                <a:rPr lang="en-US" sz="2800" b="1" dirty="0">
+                  <a:latin typeface="Arial" panose="020B0604020202020204" pitchFamily="34" charset="0"/>
+                  <a:cs typeface="Arial" panose="020B0604020202020204" pitchFamily="34" charset="0"/>
+                </a:rPr>
+                <a:t>Current risk assessment</a:t>
+              </a:r>
+            </a:p>
+          </p:txBody>
+        </p:sp>
+        <p:sp>
+          <p:nvSpPr>
+            <p:cNvPr id="4" name="Chevron 5">
+              <a:extLst>
+                <a:ext uri="{FF2B5EF4-FFF2-40B4-BE49-F238E27FC236}">
+                  <a16:creationId xmlns:a16="http://schemas.microsoft.com/office/drawing/2014/main" id="{930237D6-E492-42E9-BAC3-50B756D7E550}"/>
+                </a:ext>
+              </a:extLst>
+            </p:cNvPr>
+            <p:cNvSpPr/>
+            <p:nvPr/>
+          </p:nvSpPr>
+          <p:spPr>
+            <a:xfrm>
+              <a:off x="5173101" y="1753702"/>
+              <a:ext cx="830915" cy="1134641"/>
+            </a:xfrm>
+            <a:prstGeom prst="chevron">
+              <a:avLst/>
+            </a:prstGeom>
+            <a:solidFill>
+              <a:schemeClr val="accent1">
+                <a:lumMod val="60000"/>
+                <a:lumOff val="40000"/>
+              </a:schemeClr>
+            </a:solidFill>
+            <a:ln>
+              <a:solidFill>
+                <a:schemeClr val="accent1">
+                  <a:lumMod val="60000"/>
+                  <a:lumOff val="40000"/>
+                </a:schemeClr>
+              </a:solidFill>
+            </a:ln>
+          </p:spPr>
+          <p:style>
+            <a:lnRef idx="2">
+              <a:schemeClr val="accent1">
+                <a:shade val="50000"/>
+              </a:schemeClr>
+            </a:lnRef>
+            <a:fillRef idx="1">
+              <a:schemeClr val="accent1"/>
+            </a:fillRef>
+            <a:effectRef idx="0">
+              <a:schemeClr val="accent1"/>
+            </a:effectRef>
+            <a:fontRef idx="minor">
+              <a:schemeClr val="lt1"/>
+            </a:fontRef>
+          </p:style>
+          <p:txBody>
+            <a:bodyPr rtlCol="0" anchor="ctr"/>
+            <a:lstStyle/>
+            <a:p>
+              <a:pPr algn="ctr"/>
+              <a:endParaRPr lang="en-US">
+                <a:solidFill>
+                  <a:schemeClr val="tx1"/>
+                </a:solidFill>
+              </a:endParaRPr>
+            </a:p>
+          </p:txBody>
+        </p:sp>
+      </p:grpSp>
+      <p:grpSp>
+        <p:nvGrpSpPr>
+          <p:cNvPr id="5" name="Group 4">
+            <a:extLst>
+              <a:ext uri="{FF2B5EF4-FFF2-40B4-BE49-F238E27FC236}">
+                <a16:creationId xmlns:a16="http://schemas.microsoft.com/office/drawing/2014/main" id="{026034AB-809D-4010-97E4-2EFD7F175050}"/>
+              </a:ext>
+            </a:extLst>
+          </p:cNvPr>
+          <p:cNvGrpSpPr/>
+          <p:nvPr/>
+        </p:nvGrpSpPr>
+        <p:grpSpPr>
+          <a:xfrm>
+            <a:off x="261257" y="2302047"/>
+            <a:ext cx="11784970" cy="798961"/>
+            <a:chOff x="203200" y="1753702"/>
+            <a:chExt cx="5800816" cy="1134641"/>
+          </a:xfrm>
+        </p:grpSpPr>
+        <p:sp>
+          <p:nvSpPr>
+            <p:cNvPr id="6" name="Pentagon 3">
+              <a:extLst>
+                <a:ext uri="{FF2B5EF4-FFF2-40B4-BE49-F238E27FC236}">
+                  <a16:creationId xmlns:a16="http://schemas.microsoft.com/office/drawing/2014/main" id="{B4F717F4-22AF-4E12-A28F-F63440988DDF}"/>
+                </a:ext>
+              </a:extLst>
+            </p:cNvPr>
+            <p:cNvSpPr/>
+            <p:nvPr/>
+          </p:nvSpPr>
+          <p:spPr>
+            <a:xfrm>
+              <a:off x="203200" y="1753702"/>
+              <a:ext cx="5257700" cy="1134641"/>
+            </a:xfrm>
+            <a:prstGeom prst="homePlate">
+              <a:avLst/>
+            </a:prstGeom>
+            <a:solidFill>
+              <a:schemeClr val="accent1">
+                <a:lumMod val="75000"/>
+              </a:schemeClr>
+            </a:solidFill>
+          </p:spPr>
+          <p:style>
+            <a:lnRef idx="2">
+              <a:schemeClr val="accent1">
+                <a:shade val="50000"/>
+              </a:schemeClr>
+            </a:lnRef>
+            <a:fillRef idx="1">
+              <a:schemeClr val="accent1"/>
+            </a:fillRef>
+            <a:effectRef idx="0">
+              <a:schemeClr val="accent1"/>
+            </a:effectRef>
+            <a:fontRef idx="minor">
+              <a:schemeClr val="lt1"/>
+            </a:fontRef>
+          </p:style>
+          <p:txBody>
+            <a:bodyPr rtlCol="0" anchor="ctr"/>
+            <a:lstStyle/>
+            <a:p>
+              <a:pPr algn="ctr"/>
+              <a:r>
+                <a:rPr lang="en-US" sz="2800" b="1" dirty="0">
+                  <a:latin typeface="Arial" panose="020B0604020202020204" pitchFamily="34" charset="0"/>
+                  <a:cs typeface="Arial" panose="020B0604020202020204" pitchFamily="34" charset="0"/>
+                </a:rPr>
+                <a:t>A strategic approach to the prevention, detection and control of plague</a:t>
+              </a:r>
+            </a:p>
+          </p:txBody>
+        </p:sp>
+        <p:sp>
+          <p:nvSpPr>
+            <p:cNvPr id="7" name="Chevron 5">
+              <a:extLst>
+                <a:ext uri="{FF2B5EF4-FFF2-40B4-BE49-F238E27FC236}">
+                  <a16:creationId xmlns:a16="http://schemas.microsoft.com/office/drawing/2014/main" id="{ED31ACC8-43DF-46A3-8D65-76922A9AC6D2}"/>
+                </a:ext>
+              </a:extLst>
+            </p:cNvPr>
+            <p:cNvSpPr/>
+            <p:nvPr/>
+          </p:nvSpPr>
+          <p:spPr>
+            <a:xfrm>
+              <a:off x="5173101" y="1753702"/>
+              <a:ext cx="830915" cy="1134641"/>
+            </a:xfrm>
+            <a:prstGeom prst="chevron">
+              <a:avLst/>
+            </a:prstGeom>
+            <a:solidFill>
+              <a:schemeClr val="accent1">
+                <a:lumMod val="60000"/>
+                <a:lumOff val="40000"/>
+              </a:schemeClr>
+            </a:solidFill>
+            <a:ln>
+              <a:solidFill>
+                <a:schemeClr val="accent1">
+                  <a:lumMod val="60000"/>
+                  <a:lumOff val="40000"/>
+                </a:schemeClr>
+              </a:solidFill>
+            </a:ln>
+          </p:spPr>
+          <p:style>
+            <a:lnRef idx="2">
+              <a:schemeClr val="accent1">
+                <a:shade val="50000"/>
+              </a:schemeClr>
+            </a:lnRef>
+            <a:fillRef idx="1">
+              <a:schemeClr val="accent1"/>
+            </a:fillRef>
+            <a:effectRef idx="0">
+              <a:schemeClr val="accent1"/>
+            </a:effectRef>
+            <a:fontRef idx="minor">
+              <a:schemeClr val="lt1"/>
+            </a:fontRef>
+          </p:style>
+          <p:txBody>
+            <a:bodyPr rtlCol="0" anchor="ctr"/>
+            <a:lstStyle/>
+            <a:p>
+              <a:pPr algn="ctr"/>
+              <a:endParaRPr lang="en-US">
+                <a:solidFill>
+                  <a:schemeClr val="tx1"/>
+                </a:solidFill>
+              </a:endParaRPr>
+            </a:p>
+          </p:txBody>
+        </p:sp>
+      </p:grpSp>
+    </p:spTree>
+    <p:extLst>
+      <p:ext uri="{BB962C8B-B14F-4D97-AF65-F5344CB8AC3E}">
+        <p14:creationId xmlns:p14="http://schemas.microsoft.com/office/powerpoint/2010/main" val="1929733537"/>
       </p:ext>
     </p:extLst>
   </p:cSld>

</xml_diff>

<commit_message>
update text and figures
Editted to incoporate comments from the dicussion we had earlier today
</commit_message>
<xml_diff>
--- a/Resources/arrow_image.pptx
+++ b/Resources/arrow_image.pptx
@@ -3078,7 +3078,7 @@
           <p:cNvPr id="11" name="Group 10">
             <a:extLst>
               <a:ext uri="{FF2B5EF4-FFF2-40B4-BE49-F238E27FC236}">
-                <a16:creationId xmlns:a16="http://schemas.microsoft.com/office/drawing/2014/main" id="{498123D8-0999-4D42-9133-224F90DBB287}"/>
+                <a16:creationId xmlns:a16="http://schemas.microsoft.com/office/drawing/2014/main" xmlns="" id="{498123D8-0999-4D42-9133-224F90DBB287}"/>
               </a:ext>
             </a:extLst>
           </p:cNvPr>
@@ -3098,7 +3098,7 @@
             <p:cNvPr id="13" name="Rectangle 12">
               <a:extLst>
                 <a:ext uri="{FF2B5EF4-FFF2-40B4-BE49-F238E27FC236}">
-                  <a16:creationId xmlns:a16="http://schemas.microsoft.com/office/drawing/2014/main" id="{BA942368-1106-42A9-A878-BADA755C9DEB}"/>
+                  <a16:creationId xmlns:a16="http://schemas.microsoft.com/office/drawing/2014/main" xmlns="" id="{BA942368-1106-42A9-A878-BADA755C9DEB}"/>
                 </a:ext>
               </a:extLst>
             </p:cNvPr>
@@ -3167,7 +3167,7 @@
             <p:cNvPr id="15" name="Pentagon 3">
               <a:extLst>
                 <a:ext uri="{FF2B5EF4-FFF2-40B4-BE49-F238E27FC236}">
-                  <a16:creationId xmlns:a16="http://schemas.microsoft.com/office/drawing/2014/main" id="{F7D16F89-8756-4575-B7D9-5EA4A582CF23}"/>
+                  <a16:creationId xmlns:a16="http://schemas.microsoft.com/office/drawing/2014/main" xmlns="" id="{F7D16F89-8756-4575-B7D9-5EA4A582CF23}"/>
                 </a:ext>
               </a:extLst>
             </p:cNvPr>
@@ -3210,12 +3210,16 @@
             <a:p>
               <a:pPr algn="ctr"/>
               <a:r>
-                <a:rPr lang="en-US" sz="2800" b="1" dirty="0">
+                <a:rPr lang="en-US" sz="2800" b="1" dirty="0" smtClean="0">
                   <a:latin typeface="Arial" panose="020B0604020202020204" pitchFamily="34" charset="0"/>
                   <a:cs typeface="Arial" panose="020B0604020202020204" pitchFamily="34" charset="0"/>
                 </a:rPr>
-                <a:t>Situational Report</a:t>
+                <a:t>Situation Update</a:t>
               </a:r>
+              <a:endParaRPr lang="en-US" sz="2800" b="1" dirty="0">
+                <a:latin typeface="Arial" panose="020B0604020202020204" pitchFamily="34" charset="0"/>
+                <a:cs typeface="Arial" panose="020B0604020202020204" pitchFamily="34" charset="0"/>
+              </a:endParaRPr>
             </a:p>
           </p:txBody>
         </p:sp>
@@ -3224,7 +3228,7 @@
             <p:cNvPr id="16" name="Chevron 5">
               <a:extLst>
                 <a:ext uri="{FF2B5EF4-FFF2-40B4-BE49-F238E27FC236}">
-                  <a16:creationId xmlns:a16="http://schemas.microsoft.com/office/drawing/2014/main" id="{BD0DC667-6294-48F2-8ABC-E975FE7940C9}"/>
+                  <a16:creationId xmlns:a16="http://schemas.microsoft.com/office/drawing/2014/main" xmlns="" id="{BD0DC667-6294-48F2-8ABC-E975FE7940C9}"/>
                 </a:ext>
               </a:extLst>
             </p:cNvPr>
@@ -3288,7 +3292,7 @@
             <p:cNvPr id="17" name="Rectangle 16">
               <a:extLst>
                 <a:ext uri="{FF2B5EF4-FFF2-40B4-BE49-F238E27FC236}">
-                  <a16:creationId xmlns:a16="http://schemas.microsoft.com/office/drawing/2014/main" id="{FAFA0244-E01D-45DD-A9E4-34B9B87FAD0D}"/>
+                  <a16:creationId xmlns:a16="http://schemas.microsoft.com/office/drawing/2014/main" xmlns="" id="{FAFA0244-E01D-45DD-A9E4-34B9B87FAD0D}"/>
                 </a:ext>
               </a:extLst>
             </p:cNvPr>
@@ -3380,7 +3384,7 @@
             <p:cNvPr id="18" name="Rectangle 17">
               <a:extLst>
                 <a:ext uri="{FF2B5EF4-FFF2-40B4-BE49-F238E27FC236}">
-                  <a16:creationId xmlns:a16="http://schemas.microsoft.com/office/drawing/2014/main" id="{991D39F8-DB65-49AA-95A0-92C9D7932426}"/>
+                  <a16:creationId xmlns:a16="http://schemas.microsoft.com/office/drawing/2014/main" xmlns="" id="{991D39F8-DB65-49AA-95A0-92C9D7932426}"/>
                 </a:ext>
               </a:extLst>
             </p:cNvPr>
@@ -3495,7 +3499,7 @@
             <p:cNvPr id="19" name="Rectangle 18">
               <a:extLst>
                 <a:ext uri="{FF2B5EF4-FFF2-40B4-BE49-F238E27FC236}">
-                  <a16:creationId xmlns:a16="http://schemas.microsoft.com/office/drawing/2014/main" id="{36F29332-95C7-4A2D-BA22-CCEB9CD7985A}"/>
+                  <a16:creationId xmlns:a16="http://schemas.microsoft.com/office/drawing/2014/main" xmlns="" id="{36F29332-95C7-4A2D-BA22-CCEB9CD7985A}"/>
                 </a:ext>
               </a:extLst>
             </p:cNvPr>
@@ -3563,15 +3567,22 @@
             <a:p>
               <a:pPr algn="ctr"/>
               <a:r>
-                <a:rPr lang="en-US" b="1" dirty="0">
+                <a:rPr lang="en-US" b="1" smtClean="0">
                   <a:solidFill>
                     <a:schemeClr val="tx1"/>
                   </a:solidFill>
                   <a:latin typeface="Arial" panose="020B0604020202020204" pitchFamily="34" charset="0"/>
                   <a:cs typeface="Arial" panose="020B0604020202020204" pitchFamily="34" charset="0"/>
                 </a:rPr>
-                <a:t>CRF</a:t>
+                <a:t>CFR</a:t>
               </a:r>
+              <a:endParaRPr lang="en-US" b="1" dirty="0">
+                <a:solidFill>
+                  <a:schemeClr val="tx1"/>
+                </a:solidFill>
+                <a:latin typeface="Arial" panose="020B0604020202020204" pitchFamily="34" charset="0"/>
+                <a:cs typeface="Arial" panose="020B0604020202020204" pitchFamily="34" charset="0"/>
+              </a:endParaRPr>
             </a:p>
             <a:p>
               <a:pPr algn="ctr"/>
@@ -3586,7 +3597,7 @@
             <a:p>
               <a:pPr algn="ctr"/>
               <a:r>
-                <a:rPr lang="en-US" sz="2400" b="1">
+                <a:rPr lang="en-US" sz="2400" b="1" dirty="0">
                   <a:solidFill>
                     <a:srgbClr val="FF0000"/>
                   </a:solidFill>
@@ -3595,13 +3606,6 @@
                 </a:rPr>
                 <a:t>20%</a:t>
               </a:r>
-              <a:endParaRPr lang="en-US" sz="2400" b="1" dirty="0">
-                <a:solidFill>
-                  <a:srgbClr val="FF0000"/>
-                </a:solidFill>
-                <a:latin typeface="Arial" panose="020B0604020202020204" pitchFamily="34" charset="0"/>
-                <a:cs typeface="Arial" panose="020B0604020202020204" pitchFamily="34" charset="0"/>
-              </a:endParaRPr>
             </a:p>
           </p:txBody>
         </p:sp>
@@ -3610,7 +3614,7 @@
             <p:cNvPr id="20" name="Oval 19">
               <a:extLst>
                 <a:ext uri="{FF2B5EF4-FFF2-40B4-BE49-F238E27FC236}">
-                  <a16:creationId xmlns:a16="http://schemas.microsoft.com/office/drawing/2014/main" id="{540E7A8D-F53C-4451-8F3C-CAACA5D02631}"/>
+                  <a16:creationId xmlns:a16="http://schemas.microsoft.com/office/drawing/2014/main" xmlns="" id="{540E7A8D-F53C-4451-8F3C-CAACA5D02631}"/>
                 </a:ext>
               </a:extLst>
             </p:cNvPr>
@@ -3671,7 +3675,7 @@
           <p:cNvPr id="2" name="Rectangle 1">
             <a:extLst>
               <a:ext uri="{FF2B5EF4-FFF2-40B4-BE49-F238E27FC236}">
-                <a16:creationId xmlns:a16="http://schemas.microsoft.com/office/drawing/2014/main" id="{1B7A9F6A-D851-4974-8DD5-08B07F9AFD18}"/>
+                <a16:creationId xmlns:a16="http://schemas.microsoft.com/office/drawing/2014/main" xmlns="" id="{1B7A9F6A-D851-4974-8DD5-08B07F9AFD18}"/>
               </a:ext>
             </a:extLst>
           </p:cNvPr>
@@ -3681,7 +3685,7 @@
         <p:spPr>
           <a:xfrm>
             <a:off x="2322121" y="328443"/>
-            <a:ext cx="7272568" cy="369332"/>
+            <a:ext cx="9208868" cy="369332"/>
           </a:xfrm>
           <a:prstGeom prst="rect">
             <a:avLst/>
@@ -3694,10 +3698,16 @@
           <a:lstStyle/>
           <a:p>
             <a:r>
+              <a:rPr lang="en-US" dirty="0" smtClean="0">
+                <a:latin typeface="LMRoman17-Regular"/>
+              </a:rPr>
+              <a:t>SITUATIONAL REPORT 2: </a:t>
+            </a:r>
+            <a:r>
               <a:rPr lang="en-US" dirty="0">
                 <a:latin typeface="LMRoman17-Regular"/>
               </a:rPr>
-              <a:t>SITUATIONL REPORT: PNEUMONIC PLAGUE OUTBREAK IN NORTHEAST INDIA</a:t>
+              <a:t>PNEUMONIC PLAGUE OUTBREAK IN NORTHEAST INDIA</a:t>
             </a:r>
             <a:endParaRPr lang="en-US" dirty="0"/>
           </a:p>
@@ -3708,7 +3718,7 @@
           <p:cNvPr id="24" name="Group 23">
             <a:extLst>
               <a:ext uri="{FF2B5EF4-FFF2-40B4-BE49-F238E27FC236}">
-                <a16:creationId xmlns:a16="http://schemas.microsoft.com/office/drawing/2014/main" id="{A4C2911C-8D2A-4E98-B1D4-E6063C28F2BB}"/>
+                <a16:creationId xmlns:a16="http://schemas.microsoft.com/office/drawing/2014/main" xmlns="" id="{A4C2911C-8D2A-4E98-B1D4-E6063C28F2BB}"/>
               </a:ext>
             </a:extLst>
           </p:cNvPr>
@@ -3728,7 +3738,7 @@
             <p:cNvPr id="25" name="Pentagon 3">
               <a:extLst>
                 <a:ext uri="{FF2B5EF4-FFF2-40B4-BE49-F238E27FC236}">
-                  <a16:creationId xmlns:a16="http://schemas.microsoft.com/office/drawing/2014/main" id="{8CE0D642-AFE7-4408-ADED-D2CA3D2F5710}"/>
+                  <a16:creationId xmlns:a16="http://schemas.microsoft.com/office/drawing/2014/main" xmlns="" id="{8CE0D642-AFE7-4408-ADED-D2CA3D2F5710}"/>
                 </a:ext>
               </a:extLst>
             </p:cNvPr>
@@ -3785,7 +3795,7 @@
             <p:cNvPr id="26" name="Chevron 5">
               <a:extLst>
                 <a:ext uri="{FF2B5EF4-FFF2-40B4-BE49-F238E27FC236}">
-                  <a16:creationId xmlns:a16="http://schemas.microsoft.com/office/drawing/2014/main" id="{46DBF7AA-413D-4739-97A2-EADFCA9504E6}"/>
+                  <a16:creationId xmlns:a16="http://schemas.microsoft.com/office/drawing/2014/main" xmlns="" id="{46DBF7AA-413D-4739-97A2-EADFCA9504E6}"/>
                 </a:ext>
               </a:extLst>
             </p:cNvPr>
@@ -3850,7 +3860,7 @@
           <p:cNvPr id="29" name="Group 28">
             <a:extLst>
               <a:ext uri="{FF2B5EF4-FFF2-40B4-BE49-F238E27FC236}">
-                <a16:creationId xmlns:a16="http://schemas.microsoft.com/office/drawing/2014/main" id="{82C2262C-01F9-49C8-837A-72BA0ABBF604}"/>
+                <a16:creationId xmlns:a16="http://schemas.microsoft.com/office/drawing/2014/main" xmlns="" id="{82C2262C-01F9-49C8-837A-72BA0ABBF604}"/>
               </a:ext>
             </a:extLst>
           </p:cNvPr>
@@ -3870,7 +3880,7 @@
             <p:cNvPr id="30" name="Pentagon 3">
               <a:extLst>
                 <a:ext uri="{FF2B5EF4-FFF2-40B4-BE49-F238E27FC236}">
-                  <a16:creationId xmlns:a16="http://schemas.microsoft.com/office/drawing/2014/main" id="{7D3A111E-9672-4013-9C44-995A53DE8388}"/>
+                  <a16:creationId xmlns:a16="http://schemas.microsoft.com/office/drawing/2014/main" xmlns="" id="{7D3A111E-9672-4013-9C44-995A53DE8388}"/>
                 </a:ext>
               </a:extLst>
             </p:cNvPr>
@@ -3927,7 +3937,7 @@
             <p:cNvPr id="31" name="Chevron 5">
               <a:extLst>
                 <a:ext uri="{FF2B5EF4-FFF2-40B4-BE49-F238E27FC236}">
-                  <a16:creationId xmlns:a16="http://schemas.microsoft.com/office/drawing/2014/main" id="{5685238B-08E6-46D5-9BF2-2186E4C26112}"/>
+                  <a16:creationId xmlns:a16="http://schemas.microsoft.com/office/drawing/2014/main" xmlns="" id="{5685238B-08E6-46D5-9BF2-2186E4C26112}"/>
                 </a:ext>
               </a:extLst>
             </p:cNvPr>
@@ -4022,7 +4032,7 @@
           <p:cNvPr id="2" name="Group 1">
             <a:extLst>
               <a:ext uri="{FF2B5EF4-FFF2-40B4-BE49-F238E27FC236}">
-                <a16:creationId xmlns:a16="http://schemas.microsoft.com/office/drawing/2014/main" id="{54713BD6-F492-4A2B-88DE-E3EAD0220B26}"/>
+                <a16:creationId xmlns:a16="http://schemas.microsoft.com/office/drawing/2014/main" xmlns="" id="{54713BD6-F492-4A2B-88DE-E3EAD0220B26}"/>
               </a:ext>
             </a:extLst>
           </p:cNvPr>
@@ -4042,7 +4052,7 @@
             <p:cNvPr id="3" name="Pentagon 3">
               <a:extLst>
                 <a:ext uri="{FF2B5EF4-FFF2-40B4-BE49-F238E27FC236}">
-                  <a16:creationId xmlns:a16="http://schemas.microsoft.com/office/drawing/2014/main" id="{995265E5-F021-4EAE-8769-60E90F13EFDD}"/>
+                  <a16:creationId xmlns:a16="http://schemas.microsoft.com/office/drawing/2014/main" xmlns="" id="{995265E5-F021-4EAE-8769-60E90F13EFDD}"/>
                 </a:ext>
               </a:extLst>
             </p:cNvPr>
@@ -4099,7 +4109,7 @@
             <p:cNvPr id="4" name="Chevron 5">
               <a:extLst>
                 <a:ext uri="{FF2B5EF4-FFF2-40B4-BE49-F238E27FC236}">
-                  <a16:creationId xmlns:a16="http://schemas.microsoft.com/office/drawing/2014/main" id="{930237D6-E492-42E9-BAC3-50B756D7E550}"/>
+                  <a16:creationId xmlns:a16="http://schemas.microsoft.com/office/drawing/2014/main" xmlns="" id="{930237D6-E492-42E9-BAC3-50B756D7E550}"/>
                 </a:ext>
               </a:extLst>
             </p:cNvPr>
@@ -4164,7 +4174,7 @@
           <p:cNvPr id="5" name="Group 4">
             <a:extLst>
               <a:ext uri="{FF2B5EF4-FFF2-40B4-BE49-F238E27FC236}">
-                <a16:creationId xmlns:a16="http://schemas.microsoft.com/office/drawing/2014/main" id="{026034AB-809D-4010-97E4-2EFD7F175050}"/>
+                <a16:creationId xmlns:a16="http://schemas.microsoft.com/office/drawing/2014/main" xmlns="" id="{026034AB-809D-4010-97E4-2EFD7F175050}"/>
               </a:ext>
             </a:extLst>
           </p:cNvPr>
@@ -4184,7 +4194,7 @@
             <p:cNvPr id="6" name="Pentagon 3">
               <a:extLst>
                 <a:ext uri="{FF2B5EF4-FFF2-40B4-BE49-F238E27FC236}">
-                  <a16:creationId xmlns:a16="http://schemas.microsoft.com/office/drawing/2014/main" id="{B4F717F4-22AF-4E12-A28F-F63440988DDF}"/>
+                  <a16:creationId xmlns:a16="http://schemas.microsoft.com/office/drawing/2014/main" xmlns="" id="{B4F717F4-22AF-4E12-A28F-F63440988DDF}"/>
                 </a:ext>
               </a:extLst>
             </p:cNvPr>
@@ -4241,7 +4251,7 @@
             <p:cNvPr id="7" name="Chevron 5">
               <a:extLst>
                 <a:ext uri="{FF2B5EF4-FFF2-40B4-BE49-F238E27FC236}">
-                  <a16:creationId xmlns:a16="http://schemas.microsoft.com/office/drawing/2014/main" id="{ED31ACC8-43DF-46A3-8D65-76922A9AC6D2}"/>
+                  <a16:creationId xmlns:a16="http://schemas.microsoft.com/office/drawing/2014/main" xmlns="" id="{ED31ACC8-43DF-46A3-8D65-76922A9AC6D2}"/>
                 </a:ext>
               </a:extLst>
             </p:cNvPr>

</xml_diff>